<commit_message>
-Updated Slides Hiring and Materials -Updated Allowed capabilities for Proximity Demo -Updated NfcWrapper comment
</commit_message>
<xml_diff>
--- a/Master Windows 8.1 Location and Proximity Capabilities.pptx
+++ b/Master Windows 8.1 Location and Proximity Capabilities.pptx
@@ -5,7 +5,7 @@
     <p:sldMasterId id="2147483660" r:id="rId1"/>
   </p:sldMasterIdLst>
   <p:notesMasterIdLst>
-    <p:notesMasterId r:id="rId11"/>
+    <p:notesMasterId r:id="rId10"/>
   </p:notesMasterIdLst>
   <p:sldIdLst>
     <p:sldId id="256" r:id="rId2"/>
@@ -15,8 +15,7 @@
     <p:sldId id="262" r:id="rId6"/>
     <p:sldId id="263" r:id="rId7"/>
     <p:sldId id="260" r:id="rId8"/>
-    <p:sldId id="264" r:id="rId9"/>
-    <p:sldId id="261" r:id="rId10"/>
+    <p:sldId id="265" r:id="rId9"/>
   </p:sldIdLst>
   <p:sldSz cx="9144000" cy="6858000" type="screen4x3"/>
   <p:notesSz cx="6858000" cy="9144000"/>
@@ -216,7 +215,7 @@
           <a:p>
             <a:fld id="{B3006175-6F74-4CC4-9E19-CA123965B650}" type="datetimeFigureOut">
               <a:rPr lang="en-US" smtClean="0"/>
-              <a:t>8/19/2014</a:t>
+              <a:t>8/27/2014</a:t>
             </a:fld>
             <a:endParaRPr lang="en-US"/>
           </a:p>
@@ -1102,6 +1101,90 @@
     <p:extLst>
       <p:ext uri="{BB962C8B-B14F-4D97-AF65-F5344CB8AC3E}">
         <p14:creationId xmlns:p14="http://schemas.microsoft.com/office/powerpoint/2010/main" val="1638326965"/>
+      </p:ext>
+    </p:extLst>
+  </p:cSld>
+  <p:clrMapOvr>
+    <a:masterClrMapping/>
+  </p:clrMapOvr>
+</p:notes>
+</file>
+
+<file path=ppt/notesSlides/notesSlide8.xml><?xml version="1.0" encoding="utf-8"?>
+<p:notes xmlns:a="http://schemas.openxmlformats.org/drawingml/2006/main" xmlns:r="http://schemas.openxmlformats.org/officeDocument/2006/relationships" xmlns:p="http://schemas.openxmlformats.org/presentationml/2006/main">
+  <p:cSld>
+    <p:spTree>
+      <p:nvGrpSpPr>
+        <p:cNvPr id="1" name=""/>
+        <p:cNvGrpSpPr/>
+        <p:nvPr/>
+      </p:nvGrpSpPr>
+      <p:grpSpPr>
+        <a:xfrm>
+          <a:off x="0" y="0"/>
+          <a:ext cx="0" cy="0"/>
+          <a:chOff x="0" y="0"/>
+          <a:chExt cx="0" cy="0"/>
+        </a:xfrm>
+      </p:grpSpPr>
+      <p:sp>
+        <p:nvSpPr>
+          <p:cNvPr id="2" name="Slide Image Placeholder 1"/>
+          <p:cNvSpPr>
+            <a:spLocks noGrp="1" noRot="1" noChangeAspect="1"/>
+          </p:cNvSpPr>
+          <p:nvPr>
+            <p:ph type="sldImg"/>
+          </p:nvPr>
+        </p:nvSpPr>
+        <p:spPr/>
+      </p:sp>
+      <p:sp>
+        <p:nvSpPr>
+          <p:cNvPr id="3" name="Notes Placeholder 2"/>
+          <p:cNvSpPr>
+            <a:spLocks noGrp="1"/>
+          </p:cNvSpPr>
+          <p:nvPr>
+            <p:ph type="body" idx="1"/>
+          </p:nvPr>
+        </p:nvSpPr>
+        <p:spPr/>
+        <p:txBody>
+          <a:bodyPr/>
+          <a:lstStyle/>
+          <a:p>
+            <a:endParaRPr lang="en-US"/>
+          </a:p>
+        </p:txBody>
+      </p:sp>
+      <p:sp>
+        <p:nvSpPr>
+          <p:cNvPr id="4" name="Slide Number Placeholder 3"/>
+          <p:cNvSpPr>
+            <a:spLocks noGrp="1"/>
+          </p:cNvSpPr>
+          <p:nvPr>
+            <p:ph type="sldNum" sz="quarter" idx="10"/>
+          </p:nvPr>
+        </p:nvSpPr>
+        <p:spPr/>
+        <p:txBody>
+          <a:bodyPr/>
+          <a:lstStyle/>
+          <a:p>
+            <a:fld id="{49632F88-095D-4088-8021-F9F08FF98970}" type="slidenum">
+              <a:rPr lang="en-US" smtClean="0"/>
+              <a:t>8</a:t>
+            </a:fld>
+            <a:endParaRPr lang="en-US"/>
+          </a:p>
+        </p:txBody>
+      </p:sp>
+    </p:spTree>
+    <p:extLst>
+      <p:ext uri="{BB962C8B-B14F-4D97-AF65-F5344CB8AC3E}">
+        <p14:creationId xmlns:p14="http://schemas.microsoft.com/office/powerpoint/2010/main" val="1270046187"/>
       </p:ext>
     </p:extLst>
   </p:cSld>
@@ -3597,13 +3680,8 @@
             <a:pPr lvl="1"/>
             <a:r>
               <a:rPr lang="en-US" dirty="0" smtClean="0"/>
-              <a:t>Focused on building NUI </a:t>
-            </a:r>
-            <a:r>
-              <a:rPr lang="en-US" dirty="0" smtClean="0"/>
-              <a:t>solutions</a:t>
-            </a:r>
-            <a:endParaRPr lang="en-US" dirty="0" smtClean="0"/>
+              <a:t>Focused on building NUI solutions</a:t>
+            </a:r>
           </a:p>
           <a:p>
             <a:pPr lvl="2"/>
@@ -3617,7 +3695,7 @@
             </a:r>
             <a:r>
               <a:rPr lang="en-US" dirty="0" smtClean="0"/>
-              <a:t>WP8, </a:t>
+              <a:t>Windows Phone, </a:t>
             </a:r>
             <a:r>
               <a:rPr lang="en-US" dirty="0" err="1" smtClean="0"/>
@@ -3625,33 +3703,15 @@
             </a:r>
             <a:r>
               <a:rPr lang="en-US" dirty="0" smtClean="0"/>
-              <a:t>, </a:t>
-            </a:r>
-            <a:r>
-              <a:rPr lang="en-US" dirty="0" smtClean="0"/>
-              <a:t>Kinect</a:t>
-            </a:r>
-            <a:r>
-              <a:rPr lang="en-US" dirty="0" smtClean="0"/>
-              <a:t>, </a:t>
-            </a:r>
-            <a:r>
-              <a:rPr lang="en-US" dirty="0" smtClean="0"/>
-              <a:t>Azure</a:t>
-            </a:r>
-            <a:endParaRPr lang="en-US" dirty="0" smtClean="0"/>
+              <a:t>, WPF, Kinect, Azure</a:t>
+            </a:r>
           </a:p>
           <a:p>
             <a:pPr lvl="2"/>
             <a:r>
               <a:rPr lang="en-US" dirty="0" smtClean="0"/>
-              <a:t>Web, Mobile, </a:t>
-            </a:r>
-            <a:r>
-              <a:rPr lang="en-US" dirty="0" smtClean="0"/>
-              <a:t>Desktop, Touch, and Touchless</a:t>
-            </a:r>
-            <a:endParaRPr lang="en-US" dirty="0" smtClean="0"/>
+              <a:t>Web, Mobile, Desktop, Touch, and Touchless</a:t>
+            </a:r>
           </a:p>
           <a:p>
             <a:pPr lvl="1"/>
@@ -3664,13 +3724,8 @@
             <a:pPr lvl="2"/>
             <a:r>
               <a:rPr lang="en-US" dirty="0" smtClean="0"/>
-              <a:t>Self guided </a:t>
-            </a:r>
-            <a:r>
-              <a:rPr lang="en-US" dirty="0" smtClean="0"/>
-              <a:t>learning/My time to prepare this presentation</a:t>
-            </a:r>
-            <a:endParaRPr lang="en-US" dirty="0" smtClean="0"/>
+              <a:t>Self guided learning/My time to prepare this presentation</a:t>
+            </a:r>
           </a:p>
           <a:p>
             <a:r>
@@ -3682,11 +3737,7 @@
             <a:pPr lvl="1"/>
             <a:r>
               <a:rPr lang="en-US" dirty="0" smtClean="0"/>
-              <a:t>Graduate Neumont University 2009, B.S. C.S</a:t>
-            </a:r>
-            <a:r>
-              <a:rPr lang="en-US" dirty="0" smtClean="0"/>
-              <a:t>. </a:t>
+              <a:t>Graduate Neumont University 2009, B.S. C.S. </a:t>
             </a:r>
           </a:p>
           <a:p>
@@ -3697,27 +3748,14 @@
             </a:r>
             <a:r>
               <a:rPr lang="en-US" dirty="0" smtClean="0"/>
-              <a:t>icrosoft </a:t>
-            </a:r>
-            <a:r>
-              <a:rPr lang="en-US" dirty="0" smtClean="0"/>
-              <a:t>MVP </a:t>
-            </a:r>
-            <a:r>
-              <a:rPr lang="en-US" dirty="0" smtClean="0"/>
-              <a:t>in Windows Platform Development</a:t>
-            </a:r>
-            <a:endParaRPr lang="en-US" dirty="0" smtClean="0"/>
+              <a:t>icrosoft MVP in Windows Platform Development</a:t>
+            </a:r>
           </a:p>
           <a:p>
             <a:pPr lvl="1"/>
             <a:r>
               <a:rPr lang="en-US" dirty="0" smtClean="0"/>
-              <a:t>Avid </a:t>
-            </a:r>
-            <a:r>
-              <a:rPr lang="en-US" dirty="0" smtClean="0"/>
-              <a:t>Mt. Biker and aspiring Rock Climber</a:t>
+              <a:t>Avid Mt. Biker and aspiring Rock Climber</a:t>
             </a:r>
             <a:endParaRPr lang="en-US" dirty="0"/>
           </a:p>
@@ -3824,23 +3862,20 @@
               <a:rPr lang="en-US" dirty="0" smtClean="0"/>
               <a:t>Proximity API</a:t>
             </a:r>
-            <a:endParaRPr lang="en-US" dirty="0" smtClean="0"/>
           </a:p>
           <a:p>
             <a:pPr lvl="1"/>
             <a:r>
               <a:rPr lang="en-US" dirty="0" smtClean="0"/>
-              <a:t>NFC</a:t>
-            </a:r>
-            <a:endParaRPr lang="en-US" dirty="0" smtClean="0"/>
+              <a:t>NFC (Near Field Communication)</a:t>
+            </a:r>
           </a:p>
           <a:p>
             <a:pPr lvl="1"/>
             <a:r>
-              <a:rPr lang="en-US" dirty="0" err="1" smtClean="0"/>
-              <a:t>PeerFinder</a:t>
-            </a:r>
-            <a:endParaRPr lang="en-US" dirty="0" smtClean="0"/>
+              <a:rPr lang="en-US" dirty="0" smtClean="0"/>
+              <a:t>Peer Finding</a:t>
+            </a:r>
           </a:p>
           <a:p>
             <a:pPr marL="0" indent="0">
@@ -3964,22 +3999,45 @@
           <a:p>
             <a:pPr lvl="1"/>
             <a:r>
-              <a:rPr lang="en-US" dirty="0" smtClean="0"/>
-              <a:t>Where Am I?</a:t>
+              <a:rPr lang="en-US" dirty="0"/>
+              <a:t>Placing a geocache</a:t>
             </a:r>
           </a:p>
           <a:p>
             <a:pPr lvl="1"/>
             <a:r>
               <a:rPr lang="en-US" dirty="0" smtClean="0"/>
-              <a:t>Where Did I Park?</a:t>
+              <a:t>Where </a:t>
+            </a:r>
+            <a:r>
+              <a:rPr lang="en-US" dirty="0"/>
+              <a:t>a</a:t>
+            </a:r>
+            <a:r>
+              <a:rPr lang="en-US" dirty="0" smtClean="0"/>
+              <a:t>m I?</a:t>
             </a:r>
           </a:p>
           <a:p>
             <a:pPr lvl="1"/>
             <a:r>
               <a:rPr lang="en-US" dirty="0" smtClean="0"/>
-              <a:t>Placing A Geocache</a:t>
+              <a:t>Where </a:t>
+            </a:r>
+            <a:r>
+              <a:rPr lang="en-US" dirty="0"/>
+              <a:t>d</a:t>
+            </a:r>
+            <a:r>
+              <a:rPr lang="en-US" dirty="0" smtClean="0"/>
+              <a:t>id I park?</a:t>
+            </a:r>
+          </a:p>
+          <a:p>
+            <a:pPr lvl="1"/>
+            <a:r>
+              <a:rPr lang="en-US" dirty="0" smtClean="0"/>
+              <a:t>What country am I in?</a:t>
             </a:r>
           </a:p>
         </p:txBody>
@@ -4066,17 +4124,13 @@
           <a:lstStyle/>
           <a:p>
             <a:r>
-              <a:rPr lang="en-US" dirty="0" smtClean="0"/>
-              <a:t>Report </a:t>
-            </a:r>
-            <a:r>
-              <a:rPr lang="en-US" dirty="0"/>
-              <a:t>Interval (shortest interval used)</a:t>
-            </a:r>
-          </a:p>
-          <a:p>
-            <a:r>
-              <a:rPr lang="en-US" dirty="0"/>
+              <a:rPr lang="en-US" smtClean="0"/>
+              <a:t>Report Interval</a:t>
+            </a:r>
+          </a:p>
+          <a:p>
+            <a:r>
+              <a:rPr lang="en-US" smtClean="0"/>
               <a:t>Movement </a:t>
             </a:r>
             <a:r>
@@ -4348,7 +4402,6 @@
               <a:rPr lang="en-US" dirty="0" smtClean="0"/>
               <a:t>Similar but not the same as RFID</a:t>
             </a:r>
-            <a:endParaRPr lang="en-US" dirty="0" smtClean="0"/>
           </a:p>
           <a:p>
             <a:pPr lvl="1"/>
@@ -4375,13 +4428,8 @@
             <a:pPr lvl="1"/>
             <a:r>
               <a:rPr lang="en-US" dirty="0" smtClean="0"/>
-              <a:t>Tap To </a:t>
-            </a:r>
-            <a:r>
-              <a:rPr lang="en-US" dirty="0" smtClean="0"/>
-              <a:t>Connect via NFC</a:t>
-            </a:r>
-            <a:endParaRPr lang="en-US" dirty="0" smtClean="0"/>
+              <a:t>Tap To Connect via NFC</a:t>
+            </a:r>
           </a:p>
           <a:p>
             <a:pPr lvl="1"/>
@@ -4456,136 +4504,6 @@
           <a:chExt cx="0" cy="0"/>
         </a:xfrm>
       </p:grpSpPr>
-      <p:pic>
-        <p:nvPicPr>
-          <p:cNvPr id="7" name="Content Placeholder 6"/>
-          <p:cNvPicPr>
-            <a:picLocks noGrp="1" noChangeAspect="1"/>
-          </p:cNvPicPr>
-          <p:nvPr>
-            <p:ph sz="half" idx="1"/>
-          </p:nvPr>
-        </p:nvPicPr>
-        <p:blipFill>
-          <a:blip r:embed="rId2" cstate="print">
-            <a:extLst>
-              <a:ext uri="{28A0092B-C50C-407E-A947-70E740481C1C}">
-                <a14:useLocalDpi xmlns:a14="http://schemas.microsoft.com/office/drawing/2010/main" val="0"/>
-              </a:ext>
-            </a:extLst>
-          </a:blip>
-          <a:stretch>
-            <a:fillRect/>
-          </a:stretch>
-        </p:blipFill>
-        <p:spPr>
-          <a:xfrm>
-            <a:off x="-609600" y="1600200"/>
-            <a:ext cx="6765418" cy="4495800"/>
-          </a:xfrm>
-          <a:prstGeom prst="rect">
-            <a:avLst/>
-          </a:prstGeom>
-        </p:spPr>
-      </p:pic>
-      <p:sp>
-        <p:nvSpPr>
-          <p:cNvPr id="4" name="Title 3"/>
-          <p:cNvSpPr>
-            <a:spLocks noGrp="1"/>
-          </p:cNvSpPr>
-          <p:nvPr>
-            <p:ph type="title"/>
-          </p:nvPr>
-        </p:nvSpPr>
-        <p:spPr/>
-        <p:txBody>
-          <a:bodyPr/>
-          <a:lstStyle/>
-          <a:p>
-            <a:r>
-              <a:rPr lang="en-US" dirty="0" smtClean="0"/>
-              <a:t>We Want YOU!</a:t>
-            </a:r>
-            <a:endParaRPr lang="en-US" dirty="0"/>
-          </a:p>
-        </p:txBody>
-      </p:sp>
-      <p:sp>
-        <p:nvSpPr>
-          <p:cNvPr id="6" name="Content Placeholder 5"/>
-          <p:cNvSpPr>
-            <a:spLocks noGrp="1"/>
-          </p:cNvSpPr>
-          <p:nvPr>
-            <p:ph sz="half" idx="2"/>
-          </p:nvPr>
-        </p:nvSpPr>
-        <p:spPr>
-          <a:xfrm>
-            <a:off x="3200400" y="1600200"/>
-            <a:ext cx="6096000" cy="4525963"/>
-          </a:xfrm>
-        </p:spPr>
-        <p:txBody>
-          <a:bodyPr/>
-          <a:lstStyle/>
-          <a:p>
-            <a:r>
-              <a:rPr lang="en-US" dirty="0" smtClean="0"/>
-              <a:t>Contact Us</a:t>
-            </a:r>
-          </a:p>
-          <a:p>
-            <a:pPr lvl="1"/>
-            <a:r>
-              <a:rPr lang="en-US" dirty="0" smtClean="0">
-                <a:hlinkClick r:id="rId3"/>
-              </a:rPr>
-              <a:t>findyourcalling@interknowlogy.com</a:t>
-            </a:r>
-            <a:r>
-              <a:rPr lang="en-US" dirty="0" smtClean="0"/>
-              <a:t> and mention </a:t>
-            </a:r>
-            <a:r>
-              <a:rPr lang="en-US" dirty="0" err="1" smtClean="0"/>
-              <a:t>devLink</a:t>
-            </a:r>
-            <a:endParaRPr lang="en-US" dirty="0" smtClean="0"/>
-          </a:p>
-        </p:txBody>
-      </p:sp>
-    </p:spTree>
-    <p:extLst>
-      <p:ext uri="{BB962C8B-B14F-4D97-AF65-F5344CB8AC3E}">
-        <p14:creationId xmlns:p14="http://schemas.microsoft.com/office/powerpoint/2010/main" val="1994179942"/>
-      </p:ext>
-    </p:extLst>
-  </p:cSld>
-  <p:clrMapOvr>
-    <a:masterClrMapping/>
-  </p:clrMapOvr>
-</p:sld>
-</file>
-
-<file path=ppt/slides/slide9.xml><?xml version="1.0" encoding="utf-8"?>
-<p:sld xmlns:a="http://schemas.openxmlformats.org/drawingml/2006/main" xmlns:r="http://schemas.openxmlformats.org/officeDocument/2006/relationships" xmlns:p="http://schemas.openxmlformats.org/presentationml/2006/main">
-  <p:cSld>
-    <p:spTree>
-      <p:nvGrpSpPr>
-        <p:cNvPr id="1" name=""/>
-        <p:cNvGrpSpPr/>
-        <p:nvPr/>
-      </p:nvGrpSpPr>
-      <p:grpSpPr>
-        <a:xfrm>
-          <a:off x="0" y="0"/>
-          <a:ext cx="0" cy="0"/>
-          <a:chOff x="0" y="0"/>
-          <a:chExt cx="0" cy="0"/>
-        </a:xfrm>
-      </p:grpSpPr>
       <p:sp>
         <p:nvSpPr>
           <p:cNvPr id="2" name="Title 1"/>
@@ -4619,7 +4537,7 @@
         </p:nvSpPr>
         <p:spPr>
           <a:xfrm>
-            <a:off x="1981200" y="5764768"/>
+            <a:off x="1921018" y="1417638"/>
             <a:ext cx="5301964" cy="369332"/>
           </a:xfrm>
           <a:prstGeom prst="rect">
@@ -4635,18 +4553,317 @@
           <a:p>
             <a:r>
               <a:rPr lang="en-US" dirty="0" smtClean="0">
-                <a:hlinkClick r:id="rId2"/>
+                <a:hlinkClick r:id="rId3"/>
               </a:rPr>
               <a:t>http://blogs.interknowlogy.com/author/dannywarren/</a:t>
             </a:r>
             <a:endParaRPr lang="en-US" dirty="0"/>
+          </a:p>
+        </p:txBody>
+      </p:sp>
+      <p:sp>
+        <p:nvSpPr>
+          <p:cNvPr id="3" name="Rectangle 2"/>
+          <p:cNvSpPr/>
+          <p:nvPr/>
+        </p:nvSpPr>
+        <p:spPr>
+          <a:xfrm>
+            <a:off x="457200" y="2057400"/>
+            <a:ext cx="8229600" cy="369332"/>
+          </a:xfrm>
+          <a:prstGeom prst="rect">
+            <a:avLst/>
+          </a:prstGeom>
+        </p:spPr>
+        <p:txBody>
+          <a:bodyPr wrap="square">
+            <a:spAutoFit/>
+          </a:bodyPr>
+          <a:lstStyle/>
+          <a:p>
+            <a:pPr algn="ctr"/>
+            <a:r>
+              <a:rPr lang="en-US" dirty="0">
+                <a:hlinkClick r:id="rId4"/>
+              </a:rPr>
+              <a:t>http://blogs.interknowlogy.com/2014/08/26/devlink2014-presentation-materials</a:t>
+            </a:r>
+            <a:r>
+              <a:rPr lang="en-US" dirty="0" smtClean="0">
+                <a:hlinkClick r:id="rId4"/>
+              </a:rPr>
+              <a:t>/</a:t>
+            </a:r>
+            <a:r>
+              <a:rPr lang="en-US" dirty="0" smtClean="0"/>
+              <a:t> </a:t>
+            </a:r>
+            <a:endParaRPr lang="en-US" dirty="0"/>
+          </a:p>
+        </p:txBody>
+      </p:sp>
+      <p:sp>
+        <p:nvSpPr>
+          <p:cNvPr id="5" name="Title 3"/>
+          <p:cNvSpPr txBox="1">
+            <a:spLocks/>
+          </p:cNvSpPr>
+          <p:nvPr/>
+        </p:nvSpPr>
+        <p:spPr>
+          <a:xfrm>
+            <a:off x="609600" y="2743200"/>
+            <a:ext cx="8229600" cy="1143000"/>
+          </a:xfrm>
+          <a:prstGeom prst="rect">
+            <a:avLst/>
+          </a:prstGeom>
+        </p:spPr>
+        <p:txBody>
+          <a:bodyPr vert="horz" lIns="91440" tIns="45720" rIns="91440" bIns="45720" rtlCol="0" anchor="ctr">
+            <a:normAutofit/>
+          </a:bodyPr>
+          <a:lstStyle>
+            <a:lvl1pPr algn="ctr" defTabSz="914400" rtl="0" eaLnBrk="1" latinLnBrk="0" hangingPunct="1">
+              <a:spcBef>
+                <a:spcPct val="0"/>
+              </a:spcBef>
+              <a:buNone/>
+              <a:defRPr sz="4400" kern="1200">
+                <a:solidFill>
+                  <a:schemeClr val="tx1">
+                    <a:lumMod val="75000"/>
+                    <a:lumOff val="25000"/>
+                  </a:schemeClr>
+                </a:solidFill>
+                <a:latin typeface="Segoe UI" pitchFamily="34" charset="0"/>
+                <a:ea typeface="Segoe UI" pitchFamily="34" charset="0"/>
+                <a:cs typeface="Segoe UI" pitchFamily="34" charset="0"/>
+              </a:defRPr>
+            </a:lvl1pPr>
+          </a:lstStyle>
+          <a:p>
+            <a:r>
+              <a:rPr lang="en-US" dirty="0" smtClean="0"/>
+              <a:t>We’re Hiring</a:t>
+            </a:r>
+            <a:endParaRPr lang="en-US" dirty="0"/>
+          </a:p>
+        </p:txBody>
+      </p:sp>
+      <p:sp>
+        <p:nvSpPr>
+          <p:cNvPr id="7" name="Content Placeholder 5"/>
+          <p:cNvSpPr txBox="1">
+            <a:spLocks/>
+          </p:cNvSpPr>
+          <p:nvPr/>
+        </p:nvSpPr>
+        <p:spPr>
+          <a:xfrm>
+            <a:off x="609600" y="3886200"/>
+            <a:ext cx="8077200" cy="4525963"/>
+          </a:xfrm>
+          <a:prstGeom prst="rect">
+            <a:avLst/>
+          </a:prstGeom>
+        </p:spPr>
+        <p:txBody>
+          <a:bodyPr/>
+          <a:lstStyle>
+            <a:lvl1pPr marL="342900" indent="-342900" algn="l" defTabSz="914400" rtl="0" eaLnBrk="1" latinLnBrk="0" hangingPunct="1">
+              <a:spcBef>
+                <a:spcPct val="20000"/>
+              </a:spcBef>
+              <a:buFont typeface="Arial" pitchFamily="34" charset="0"/>
+              <a:buChar char="•"/>
+              <a:defRPr sz="3200" kern="1200">
+                <a:solidFill>
+                  <a:schemeClr val="tx1">
+                    <a:lumMod val="65000"/>
+                    <a:lumOff val="35000"/>
+                  </a:schemeClr>
+                </a:solidFill>
+                <a:latin typeface="Segoe UI" pitchFamily="34" charset="0"/>
+                <a:ea typeface="Segoe UI" pitchFamily="34" charset="0"/>
+                <a:cs typeface="Segoe UI" pitchFamily="34" charset="0"/>
+              </a:defRPr>
+            </a:lvl1pPr>
+            <a:lvl2pPr marL="742950" indent="-285750" algn="l" defTabSz="914400" rtl="0" eaLnBrk="1" latinLnBrk="0" hangingPunct="1">
+              <a:spcBef>
+                <a:spcPct val="20000"/>
+              </a:spcBef>
+              <a:buFont typeface="Arial" pitchFamily="34" charset="0"/>
+              <a:buChar char="–"/>
+              <a:defRPr sz="2800" kern="1200">
+                <a:solidFill>
+                  <a:schemeClr val="tx1">
+                    <a:lumMod val="65000"/>
+                    <a:lumOff val="35000"/>
+                  </a:schemeClr>
+                </a:solidFill>
+                <a:latin typeface="Segoe UI" pitchFamily="34" charset="0"/>
+                <a:ea typeface="Segoe UI" pitchFamily="34" charset="0"/>
+                <a:cs typeface="Segoe UI" pitchFamily="34" charset="0"/>
+              </a:defRPr>
+            </a:lvl2pPr>
+            <a:lvl3pPr marL="1143000" indent="-228600" algn="l" defTabSz="914400" rtl="0" eaLnBrk="1" latinLnBrk="0" hangingPunct="1">
+              <a:spcBef>
+                <a:spcPct val="20000"/>
+              </a:spcBef>
+              <a:buFont typeface="Arial" pitchFamily="34" charset="0"/>
+              <a:buChar char="•"/>
+              <a:defRPr sz="2400" kern="1200">
+                <a:solidFill>
+                  <a:schemeClr val="tx1">
+                    <a:lumMod val="65000"/>
+                    <a:lumOff val="35000"/>
+                  </a:schemeClr>
+                </a:solidFill>
+                <a:latin typeface="Segoe UI" pitchFamily="34" charset="0"/>
+                <a:ea typeface="Segoe UI" pitchFamily="34" charset="0"/>
+                <a:cs typeface="Segoe UI" pitchFamily="34" charset="0"/>
+              </a:defRPr>
+            </a:lvl3pPr>
+            <a:lvl4pPr marL="1600200" indent="-228600" algn="l" defTabSz="914400" rtl="0" eaLnBrk="1" latinLnBrk="0" hangingPunct="1">
+              <a:spcBef>
+                <a:spcPct val="20000"/>
+              </a:spcBef>
+              <a:buFont typeface="Arial" pitchFamily="34" charset="0"/>
+              <a:buChar char="–"/>
+              <a:defRPr sz="2000" kern="1200">
+                <a:solidFill>
+                  <a:schemeClr val="tx1">
+                    <a:lumMod val="65000"/>
+                    <a:lumOff val="35000"/>
+                  </a:schemeClr>
+                </a:solidFill>
+                <a:latin typeface="Segoe UI" pitchFamily="34" charset="0"/>
+                <a:ea typeface="Segoe UI" pitchFamily="34" charset="0"/>
+                <a:cs typeface="Segoe UI" pitchFamily="34" charset="0"/>
+              </a:defRPr>
+            </a:lvl4pPr>
+            <a:lvl5pPr marL="2057400" indent="-228600" algn="l" defTabSz="914400" rtl="0" eaLnBrk="1" latinLnBrk="0" hangingPunct="1">
+              <a:spcBef>
+                <a:spcPct val="20000"/>
+              </a:spcBef>
+              <a:buFont typeface="Arial" pitchFamily="34" charset="0"/>
+              <a:buChar char="»"/>
+              <a:defRPr sz="2000" kern="1200">
+                <a:solidFill>
+                  <a:schemeClr val="tx1">
+                    <a:lumMod val="65000"/>
+                    <a:lumOff val="35000"/>
+                  </a:schemeClr>
+                </a:solidFill>
+                <a:latin typeface="Segoe UI" pitchFamily="34" charset="0"/>
+                <a:ea typeface="Segoe UI" pitchFamily="34" charset="0"/>
+                <a:cs typeface="Segoe UI" pitchFamily="34" charset="0"/>
+              </a:defRPr>
+            </a:lvl5pPr>
+            <a:lvl6pPr marL="2514600" indent="-228600" algn="l" defTabSz="914400" rtl="0" eaLnBrk="1" latinLnBrk="0" hangingPunct="1">
+              <a:spcBef>
+                <a:spcPct val="20000"/>
+              </a:spcBef>
+              <a:buFont typeface="Arial" pitchFamily="34" charset="0"/>
+              <a:buChar char="•"/>
+              <a:defRPr sz="2000" kern="1200">
+                <a:solidFill>
+                  <a:schemeClr val="tx1"/>
+                </a:solidFill>
+                <a:latin typeface="+mn-lt"/>
+                <a:ea typeface="+mn-ea"/>
+                <a:cs typeface="+mn-cs"/>
+              </a:defRPr>
+            </a:lvl6pPr>
+            <a:lvl7pPr marL="2971800" indent="-228600" algn="l" defTabSz="914400" rtl="0" eaLnBrk="1" latinLnBrk="0" hangingPunct="1">
+              <a:spcBef>
+                <a:spcPct val="20000"/>
+              </a:spcBef>
+              <a:buFont typeface="Arial" pitchFamily="34" charset="0"/>
+              <a:buChar char="•"/>
+              <a:defRPr sz="2000" kern="1200">
+                <a:solidFill>
+                  <a:schemeClr val="tx1"/>
+                </a:solidFill>
+                <a:latin typeface="+mn-lt"/>
+                <a:ea typeface="+mn-ea"/>
+                <a:cs typeface="+mn-cs"/>
+              </a:defRPr>
+            </a:lvl7pPr>
+            <a:lvl8pPr marL="3429000" indent="-228600" algn="l" defTabSz="914400" rtl="0" eaLnBrk="1" latinLnBrk="0" hangingPunct="1">
+              <a:spcBef>
+                <a:spcPct val="20000"/>
+              </a:spcBef>
+              <a:buFont typeface="Arial" pitchFamily="34" charset="0"/>
+              <a:buChar char="•"/>
+              <a:defRPr sz="2000" kern="1200">
+                <a:solidFill>
+                  <a:schemeClr val="tx1"/>
+                </a:solidFill>
+                <a:latin typeface="+mn-lt"/>
+                <a:ea typeface="+mn-ea"/>
+                <a:cs typeface="+mn-cs"/>
+              </a:defRPr>
+            </a:lvl8pPr>
+            <a:lvl9pPr marL="3886200" indent="-228600" algn="l" defTabSz="914400" rtl="0" eaLnBrk="1" latinLnBrk="0" hangingPunct="1">
+              <a:spcBef>
+                <a:spcPct val="20000"/>
+              </a:spcBef>
+              <a:buFont typeface="Arial" pitchFamily="34" charset="0"/>
+              <a:buChar char="•"/>
+              <a:defRPr sz="2000" kern="1200">
+                <a:solidFill>
+                  <a:schemeClr val="tx1"/>
+                </a:solidFill>
+                <a:latin typeface="+mn-lt"/>
+                <a:ea typeface="+mn-ea"/>
+                <a:cs typeface="+mn-cs"/>
+              </a:defRPr>
+            </a:lvl9pPr>
+          </a:lstStyle>
+          <a:p>
+            <a:pPr marL="0" indent="0" algn="ctr">
+              <a:buNone/>
+            </a:pPr>
+            <a:r>
+              <a:rPr lang="en-US" dirty="0" smtClean="0"/>
+              <a:t>Contact Us and Apply Now</a:t>
+            </a:r>
+          </a:p>
+          <a:p>
+            <a:pPr marL="0" indent="0" algn="ctr">
+              <a:buNone/>
+            </a:pPr>
+            <a:r>
+              <a:rPr lang="en-US" dirty="0" smtClean="0">
+                <a:hlinkClick r:id="rId5"/>
+              </a:rPr>
+              <a:t>findyourcalling@interknowlogy.com</a:t>
+            </a:r>
+            <a:endParaRPr lang="en-US" dirty="0" smtClean="0"/>
+          </a:p>
+          <a:p>
+            <a:pPr marL="0" indent="0" algn="ctr">
+              <a:buNone/>
+            </a:pPr>
+            <a:r>
+              <a:rPr lang="en-US" dirty="0" smtClean="0"/>
+              <a:t>Mention </a:t>
+            </a:r>
+            <a:r>
+              <a:rPr lang="en-US" dirty="0" err="1" smtClean="0"/>
+              <a:t>devLink</a:t>
+            </a:r>
+            <a:endParaRPr lang="en-US" dirty="0" smtClean="0"/>
           </a:p>
         </p:txBody>
       </p:sp>
     </p:spTree>
     <p:extLst>
       <p:ext uri="{BB962C8B-B14F-4D97-AF65-F5344CB8AC3E}">
-        <p14:creationId xmlns:p14="http://schemas.microsoft.com/office/powerpoint/2010/main" val="3060978179"/>
+        <p14:creationId xmlns:p14="http://schemas.microsoft.com/office/powerpoint/2010/main" val="243217305"/>
       </p:ext>
     </p:extLst>
   </p:cSld>

</xml_diff>